<commit_message>
[add]LEARN about boot - service
</commit_message>
<xml_diff>
--- a/asset/asset-factory.pptx
+++ b/asset/asset-factory.pptx
@@ -105,6 +105,11 @@
       </a:defRPr>
     </a:lvl9pPr>
   </p:defaultTextStyle>
+  <p:extLst>
+    <p:ext uri="{EFAFB233-063F-42B5-8137-9DF3F51BA10A}">
+      <p15:sldGuideLst xmlns:p15="http://schemas.microsoft.com/office/powerpoint/2012/main"/>
+    </p:ext>
+  </p:extLst>
 </p:presentation>
 </file>
 
@@ -4235,6 +4240,616 @@
           <a:chExt cx="0" cy="0"/>
         </a:xfrm>
       </p:grpSpPr>
+      <p:sp>
+        <p:nvSpPr>
+          <p:cNvPr id="24" name="正方形/長方形 23">
+            <a:extLst>
+              <a:ext uri="{FF2B5EF4-FFF2-40B4-BE49-F238E27FC236}">
+                <a16:creationId xmlns:a16="http://schemas.microsoft.com/office/drawing/2014/main" id="{49120933-67F4-2822-629B-703AAE26E5B9}"/>
+              </a:ext>
+            </a:extLst>
+          </p:cNvPr>
+          <p:cNvSpPr/>
+          <p:nvPr/>
+        </p:nvSpPr>
+        <p:spPr>
+          <a:xfrm>
+            <a:off x="537410" y="547695"/>
+            <a:ext cx="10507579" cy="3679400"/>
+          </a:xfrm>
+          <a:prstGeom prst="rect">
+            <a:avLst/>
+          </a:prstGeom>
+          <a:solidFill>
+            <a:schemeClr val="bg1"/>
+          </a:solidFill>
+          <a:ln>
+            <a:noFill/>
+          </a:ln>
+        </p:spPr>
+        <p:style>
+          <a:lnRef idx="2">
+            <a:schemeClr val="accent1">
+              <a:shade val="15000"/>
+            </a:schemeClr>
+          </a:lnRef>
+          <a:fillRef idx="1">
+            <a:schemeClr val="accent1"/>
+          </a:fillRef>
+          <a:effectRef idx="0">
+            <a:schemeClr val="accent1"/>
+          </a:effectRef>
+          <a:fontRef idx="minor">
+            <a:schemeClr val="lt1"/>
+          </a:fontRef>
+        </p:style>
+        <p:txBody>
+          <a:bodyPr rtlCol="0" anchor="ctr"/>
+          <a:lstStyle/>
+          <a:p>
+            <a:pPr algn="ctr"/>
+            <a:endParaRPr kumimoji="1" lang="ja-JP" altLang="en-US"/>
+          </a:p>
+        </p:txBody>
+      </p:sp>
+      <p:grpSp>
+        <p:nvGrpSpPr>
+          <p:cNvPr id="25" name="グループ化 24">
+            <a:extLst>
+              <a:ext uri="{FF2B5EF4-FFF2-40B4-BE49-F238E27FC236}">
+                <a16:creationId xmlns:a16="http://schemas.microsoft.com/office/drawing/2014/main" id="{7FAF99B4-8484-E939-F109-818EF33A97E3}"/>
+              </a:ext>
+            </a:extLst>
+          </p:cNvPr>
+          <p:cNvGrpSpPr/>
+          <p:nvPr/>
+        </p:nvGrpSpPr>
+        <p:grpSpPr>
+          <a:xfrm>
+            <a:off x="1475873" y="1001910"/>
+            <a:ext cx="8630652" cy="2770970"/>
+            <a:chOff x="1780674" y="611863"/>
+            <a:chExt cx="8630652" cy="2770970"/>
+          </a:xfrm>
+        </p:grpSpPr>
+        <p:sp>
+          <p:nvSpPr>
+            <p:cNvPr id="3" name="正方形/長方形 2">
+              <a:extLst>
+                <a:ext uri="{FF2B5EF4-FFF2-40B4-BE49-F238E27FC236}">
+                  <a16:creationId xmlns:a16="http://schemas.microsoft.com/office/drawing/2014/main" id="{D329271E-0150-2D81-6B94-BBB385E390AB}"/>
+                </a:ext>
+              </a:extLst>
+            </p:cNvPr>
+            <p:cNvSpPr/>
+            <p:nvPr/>
+          </p:nvSpPr>
+          <p:spPr>
+            <a:xfrm>
+              <a:off x="1780674" y="1463882"/>
+              <a:ext cx="1440000" cy="1440000"/>
+            </a:xfrm>
+            <a:prstGeom prst="rect">
+              <a:avLst/>
+            </a:prstGeom>
+            <a:solidFill>
+              <a:schemeClr val="tx1">
+                <a:lumMod val="75000"/>
+                <a:lumOff val="25000"/>
+              </a:schemeClr>
+            </a:solidFill>
+            <a:ln>
+              <a:noFill/>
+            </a:ln>
+          </p:spPr>
+          <p:style>
+            <a:lnRef idx="2">
+              <a:schemeClr val="accent1">
+                <a:shade val="15000"/>
+              </a:schemeClr>
+            </a:lnRef>
+            <a:fillRef idx="1">
+              <a:schemeClr val="accent1"/>
+            </a:fillRef>
+            <a:effectRef idx="0">
+              <a:schemeClr val="accent1"/>
+            </a:effectRef>
+            <a:fontRef idx="minor">
+              <a:schemeClr val="lt1"/>
+            </a:fontRef>
+          </p:style>
+          <p:txBody>
+            <a:bodyPr rtlCol="0" anchor="ctr"/>
+            <a:lstStyle/>
+            <a:p>
+              <a:pPr algn="ctr"/>
+              <a:r>
+                <a:rPr kumimoji="1" lang="en-US" altLang="ja-JP" sz="1600" dirty="0" err="1">
+                  <a:solidFill>
+                    <a:schemeClr val="bg1"/>
+                  </a:solidFill>
+                  <a:latin typeface="メイリオ" panose="020B0604030504040204" pitchFamily="50" charset="-128"/>
+                  <a:ea typeface="メイリオ" panose="020B0604030504040204" pitchFamily="50" charset="-128"/>
+                </a:rPr>
+                <a:t>systemd</a:t>
+              </a:r>
+              <a:endParaRPr kumimoji="1" lang="ja-JP" altLang="en-US" sz="1600" dirty="0">
+                <a:solidFill>
+                  <a:schemeClr val="bg1"/>
+                </a:solidFill>
+                <a:latin typeface="メイリオ" panose="020B0604030504040204" pitchFamily="50" charset="-128"/>
+                <a:ea typeface="メイリオ" panose="020B0604030504040204" pitchFamily="50" charset="-128"/>
+              </a:endParaRPr>
+            </a:p>
+          </p:txBody>
+        </p:sp>
+        <p:sp>
+          <p:nvSpPr>
+            <p:cNvPr id="4" name="正方形/長方形 3">
+              <a:extLst>
+                <a:ext uri="{FF2B5EF4-FFF2-40B4-BE49-F238E27FC236}">
+                  <a16:creationId xmlns:a16="http://schemas.microsoft.com/office/drawing/2014/main" id="{55529EB6-2315-FA1C-6250-673D8B25DF0B}"/>
+                </a:ext>
+              </a:extLst>
+            </p:cNvPr>
+            <p:cNvSpPr/>
+            <p:nvPr/>
+          </p:nvSpPr>
+          <p:spPr>
+            <a:xfrm>
+              <a:off x="5376000" y="1463882"/>
+              <a:ext cx="1440000" cy="1440000"/>
+            </a:xfrm>
+            <a:prstGeom prst="rect">
+              <a:avLst/>
+            </a:prstGeom>
+            <a:solidFill>
+              <a:schemeClr val="accent1">
+                <a:lumMod val="75000"/>
+              </a:schemeClr>
+            </a:solidFill>
+            <a:ln>
+              <a:noFill/>
+            </a:ln>
+          </p:spPr>
+          <p:style>
+            <a:lnRef idx="2">
+              <a:schemeClr val="accent1">
+                <a:shade val="15000"/>
+              </a:schemeClr>
+            </a:lnRef>
+            <a:fillRef idx="1">
+              <a:schemeClr val="accent1"/>
+            </a:fillRef>
+            <a:effectRef idx="0">
+              <a:schemeClr val="accent1"/>
+            </a:effectRef>
+            <a:fontRef idx="minor">
+              <a:schemeClr val="lt1"/>
+            </a:fontRef>
+          </p:style>
+          <p:txBody>
+            <a:bodyPr rtlCol="0" anchor="ctr"/>
+            <a:lstStyle/>
+            <a:p>
+              <a:pPr algn="ctr"/>
+              <a:r>
+                <a:rPr kumimoji="1" lang="en-US" altLang="ja-JP" sz="1600" dirty="0">
+                  <a:solidFill>
+                    <a:schemeClr val="bg1"/>
+                  </a:solidFill>
+                  <a:latin typeface="メイリオ" panose="020B0604030504040204" pitchFamily="50" charset="-128"/>
+                  <a:ea typeface="メイリオ" panose="020B0604030504040204" pitchFamily="50" charset="-128"/>
+                </a:rPr>
+                <a:t>autoexec.sh</a:t>
+              </a:r>
+              <a:endParaRPr kumimoji="1" lang="ja-JP" altLang="en-US" sz="1600" dirty="0">
+                <a:solidFill>
+                  <a:schemeClr val="bg1"/>
+                </a:solidFill>
+                <a:latin typeface="メイリオ" panose="020B0604030504040204" pitchFamily="50" charset="-128"/>
+                <a:ea typeface="メイリオ" panose="020B0604030504040204" pitchFamily="50" charset="-128"/>
+              </a:endParaRPr>
+            </a:p>
+          </p:txBody>
+        </p:sp>
+        <p:sp>
+          <p:nvSpPr>
+            <p:cNvPr id="5" name="正方形/長方形 4">
+              <a:extLst>
+                <a:ext uri="{FF2B5EF4-FFF2-40B4-BE49-F238E27FC236}">
+                  <a16:creationId xmlns:a16="http://schemas.microsoft.com/office/drawing/2014/main" id="{D4434FAA-1E2A-0B09-3686-8981226A7348}"/>
+                </a:ext>
+              </a:extLst>
+            </p:cNvPr>
+            <p:cNvSpPr/>
+            <p:nvPr/>
+          </p:nvSpPr>
+          <p:spPr>
+            <a:xfrm>
+              <a:off x="8971326" y="1463882"/>
+              <a:ext cx="1440000" cy="1440000"/>
+            </a:xfrm>
+            <a:prstGeom prst="rect">
+              <a:avLst/>
+            </a:prstGeom>
+            <a:solidFill>
+              <a:schemeClr val="accent2">
+                <a:lumMod val="75000"/>
+              </a:schemeClr>
+            </a:solidFill>
+            <a:ln>
+              <a:noFill/>
+            </a:ln>
+          </p:spPr>
+          <p:style>
+            <a:lnRef idx="2">
+              <a:schemeClr val="accent1">
+                <a:shade val="15000"/>
+              </a:schemeClr>
+            </a:lnRef>
+            <a:fillRef idx="1">
+              <a:schemeClr val="accent1"/>
+            </a:fillRef>
+            <a:effectRef idx="0">
+              <a:schemeClr val="accent1"/>
+            </a:effectRef>
+            <a:fontRef idx="minor">
+              <a:schemeClr val="lt1"/>
+            </a:fontRef>
+          </p:style>
+          <p:txBody>
+            <a:bodyPr rtlCol="0" anchor="ctr"/>
+            <a:lstStyle/>
+            <a:p>
+              <a:pPr algn="ctr"/>
+              <a:r>
+                <a:rPr kumimoji="1" lang="ja-JP" altLang="en-US" sz="1600" dirty="0">
+                  <a:solidFill>
+                    <a:schemeClr val="bg1"/>
+                  </a:solidFill>
+                  <a:latin typeface="メイリオ" panose="020B0604030504040204" pitchFamily="50" charset="-128"/>
+                  <a:ea typeface="メイリオ" panose="020B0604030504040204" pitchFamily="50" charset="-128"/>
+                </a:rPr>
+                <a:t>プログラム</a:t>
+              </a:r>
+            </a:p>
+          </p:txBody>
+        </p:sp>
+        <p:cxnSp>
+          <p:nvCxnSpPr>
+            <p:cNvPr id="7" name="直線矢印コネクタ 6">
+              <a:extLst>
+                <a:ext uri="{FF2B5EF4-FFF2-40B4-BE49-F238E27FC236}">
+                  <a16:creationId xmlns:a16="http://schemas.microsoft.com/office/drawing/2014/main" id="{2743ADAF-1EC7-812F-3570-4698B8024DCC}"/>
+                </a:ext>
+              </a:extLst>
+            </p:cNvPr>
+            <p:cNvCxnSpPr>
+              <a:cxnSpLocks/>
+              <a:stCxn id="3" idx="3"/>
+              <a:endCxn id="4" idx="1"/>
+            </p:cNvCxnSpPr>
+            <p:nvPr/>
+          </p:nvCxnSpPr>
+          <p:spPr>
+            <a:xfrm>
+              <a:off x="3220674" y="2183882"/>
+              <a:ext cx="2155326" cy="0"/>
+            </a:xfrm>
+            <a:prstGeom prst="straightConnector1">
+              <a:avLst/>
+            </a:prstGeom>
+            <a:ln w="28575">
+              <a:solidFill>
+                <a:schemeClr val="tx1">
+                  <a:lumMod val="50000"/>
+                  <a:lumOff val="50000"/>
+                </a:schemeClr>
+              </a:solidFill>
+              <a:tailEnd type="triangle"/>
+            </a:ln>
+          </p:spPr>
+          <p:style>
+            <a:lnRef idx="1">
+              <a:schemeClr val="accent1"/>
+            </a:lnRef>
+            <a:fillRef idx="0">
+              <a:schemeClr val="accent1"/>
+            </a:fillRef>
+            <a:effectRef idx="0">
+              <a:schemeClr val="accent1"/>
+            </a:effectRef>
+            <a:fontRef idx="minor">
+              <a:schemeClr val="tx1"/>
+            </a:fontRef>
+          </p:style>
+        </p:cxnSp>
+        <p:cxnSp>
+          <p:nvCxnSpPr>
+            <p:cNvPr id="10" name="直線矢印コネクタ 9">
+              <a:extLst>
+                <a:ext uri="{FF2B5EF4-FFF2-40B4-BE49-F238E27FC236}">
+                  <a16:creationId xmlns:a16="http://schemas.microsoft.com/office/drawing/2014/main" id="{CC30E7CA-E7D8-EA17-2A00-88736D64500D}"/>
+                </a:ext>
+              </a:extLst>
+            </p:cNvPr>
+            <p:cNvCxnSpPr>
+              <a:cxnSpLocks/>
+              <a:stCxn id="4" idx="3"/>
+              <a:endCxn id="5" idx="1"/>
+            </p:cNvCxnSpPr>
+            <p:nvPr/>
+          </p:nvCxnSpPr>
+          <p:spPr>
+            <a:xfrm>
+              <a:off x="6816000" y="2183882"/>
+              <a:ext cx="2155326" cy="0"/>
+            </a:xfrm>
+            <a:prstGeom prst="straightConnector1">
+              <a:avLst/>
+            </a:prstGeom>
+            <a:ln w="28575">
+              <a:solidFill>
+                <a:schemeClr val="tx1">
+                  <a:lumMod val="50000"/>
+                  <a:lumOff val="50000"/>
+                </a:schemeClr>
+              </a:solidFill>
+              <a:tailEnd type="triangle"/>
+            </a:ln>
+          </p:spPr>
+          <p:style>
+            <a:lnRef idx="1">
+              <a:schemeClr val="accent1"/>
+            </a:lnRef>
+            <a:fillRef idx="0">
+              <a:schemeClr val="accent1"/>
+            </a:fillRef>
+            <a:effectRef idx="0">
+              <a:schemeClr val="accent1"/>
+            </a:effectRef>
+            <a:fontRef idx="minor">
+              <a:schemeClr val="tx1"/>
+            </a:fontRef>
+          </p:style>
+        </p:cxnSp>
+        <p:pic>
+          <p:nvPicPr>
+            <p:cNvPr id="16" name="グラフィックス 15" descr="紙">
+              <a:extLst>
+                <a:ext uri="{FF2B5EF4-FFF2-40B4-BE49-F238E27FC236}">
+                  <a16:creationId xmlns:a16="http://schemas.microsoft.com/office/drawing/2014/main" id="{4500AEAF-BD34-E29B-64F3-B040BABB5031}"/>
+                </a:ext>
+              </a:extLst>
+            </p:cNvPr>
+            <p:cNvPicPr>
+              <a:picLocks noChangeAspect="1"/>
+            </p:cNvPicPr>
+            <p:nvPr/>
+          </p:nvPicPr>
+          <p:blipFill>
+            <a:blip r:embed="rId2">
+              <a:extLst>
+                <a:ext uri="{96DAC541-7B7A-43D3-8B79-37D633B846F1}">
+                  <asvg:svgBlip xmlns:asvg="http://schemas.microsoft.com/office/drawing/2016/SVG/main" r:embed="rId3"/>
+                </a:ext>
+              </a:extLst>
+            </a:blip>
+            <a:stretch>
+              <a:fillRect/>
+            </a:stretch>
+          </p:blipFill>
+          <p:spPr>
+            <a:xfrm>
+              <a:off x="4011583" y="611863"/>
+              <a:ext cx="573503" cy="573503"/>
+            </a:xfrm>
+            <a:prstGeom prst="rect">
+              <a:avLst/>
+            </a:prstGeom>
+          </p:spPr>
+        </p:pic>
+        <p:sp>
+          <p:nvSpPr>
+            <p:cNvPr id="17" name="テキスト ボックス 16">
+              <a:extLst>
+                <a:ext uri="{FF2B5EF4-FFF2-40B4-BE49-F238E27FC236}">
+                  <a16:creationId xmlns:a16="http://schemas.microsoft.com/office/drawing/2014/main" id="{E822CC1A-4038-4AF4-25E2-5C2C4204D474}"/>
+                </a:ext>
+              </a:extLst>
+            </p:cNvPr>
+            <p:cNvSpPr txBox="1"/>
+            <p:nvPr/>
+          </p:nvSpPr>
+          <p:spPr>
+            <a:xfrm>
+              <a:off x="3531684" y="1253545"/>
+              <a:ext cx="1533305" cy="646331"/>
+            </a:xfrm>
+            <a:prstGeom prst="rect">
+              <a:avLst/>
+            </a:prstGeom>
+            <a:noFill/>
+          </p:spPr>
+          <p:txBody>
+            <a:bodyPr wrap="none" rtlCol="0">
+              <a:spAutoFit/>
+            </a:bodyPr>
+            <a:lstStyle/>
+            <a:p>
+              <a:pPr algn="ctr"/>
+              <a:r>
+                <a:rPr kumimoji="1" lang="en-US" altLang="ja-JP" sz="1200" dirty="0" err="1">
+                  <a:latin typeface="メイリオ" panose="020B0604030504040204" pitchFamily="50" charset="-128"/>
+                  <a:ea typeface="メイリオ" panose="020B0604030504040204" pitchFamily="50" charset="-128"/>
+                </a:rPr>
+                <a:t>RasPIAuto.service</a:t>
+              </a:r>
+              <a:endParaRPr kumimoji="1" lang="en-US" altLang="ja-JP" sz="1200" dirty="0">
+                <a:latin typeface="メイリオ" panose="020B0604030504040204" pitchFamily="50" charset="-128"/>
+                <a:ea typeface="メイリオ" panose="020B0604030504040204" pitchFamily="50" charset="-128"/>
+              </a:endParaRPr>
+            </a:p>
+            <a:p>
+              <a:pPr algn="ctr"/>
+              <a:r>
+                <a:rPr lang="ja-JP" altLang="en-US" sz="1200" dirty="0">
+                  <a:latin typeface="メイリオ" panose="020B0604030504040204" pitchFamily="50" charset="-128"/>
+                  <a:ea typeface="メイリオ" panose="020B0604030504040204" pitchFamily="50" charset="-128"/>
+                </a:rPr>
+                <a:t>に基づく</a:t>
+              </a:r>
+              <a:endParaRPr lang="en-US" altLang="ja-JP" sz="1200" dirty="0">
+                <a:latin typeface="メイリオ" panose="020B0604030504040204" pitchFamily="50" charset="-128"/>
+                <a:ea typeface="メイリオ" panose="020B0604030504040204" pitchFamily="50" charset="-128"/>
+              </a:endParaRPr>
+            </a:p>
+            <a:p>
+              <a:pPr algn="ctr"/>
+              <a:r>
+                <a:rPr lang="ja-JP" altLang="en-US" sz="1200" dirty="0">
+                  <a:latin typeface="メイリオ" panose="020B0604030504040204" pitchFamily="50" charset="-128"/>
+                  <a:ea typeface="メイリオ" panose="020B0604030504040204" pitchFamily="50" charset="-128"/>
+                </a:rPr>
+                <a:t>対象・タイミング</a:t>
+              </a:r>
+              <a:endParaRPr kumimoji="1" lang="ja-JP" altLang="en-US" sz="1200" dirty="0">
+                <a:latin typeface="メイリオ" panose="020B0604030504040204" pitchFamily="50" charset="-128"/>
+                <a:ea typeface="メイリオ" panose="020B0604030504040204" pitchFamily="50" charset="-128"/>
+              </a:endParaRPr>
+            </a:p>
+          </p:txBody>
+        </p:sp>
+        <p:sp>
+          <p:nvSpPr>
+            <p:cNvPr id="20" name="テキスト ボックス 19">
+              <a:extLst>
+                <a:ext uri="{FF2B5EF4-FFF2-40B4-BE49-F238E27FC236}">
+                  <a16:creationId xmlns:a16="http://schemas.microsoft.com/office/drawing/2014/main" id="{D61BD9DB-C24D-2B86-ACFF-4C8D86D92E26}"/>
+                </a:ext>
+              </a:extLst>
+            </p:cNvPr>
+            <p:cNvSpPr txBox="1"/>
+            <p:nvPr/>
+          </p:nvSpPr>
+          <p:spPr>
+            <a:xfrm>
+              <a:off x="3898227" y="2467889"/>
+              <a:ext cx="800219" cy="276999"/>
+            </a:xfrm>
+            <a:prstGeom prst="rect">
+              <a:avLst/>
+            </a:prstGeom>
+            <a:noFill/>
+          </p:spPr>
+          <p:txBody>
+            <a:bodyPr wrap="none" rtlCol="0">
+              <a:spAutoFit/>
+            </a:bodyPr>
+            <a:lstStyle/>
+            <a:p>
+              <a:pPr algn="ctr"/>
+              <a:r>
+                <a:rPr kumimoji="1" lang="ja-JP" altLang="en-US" sz="1200" dirty="0">
+                  <a:latin typeface="メイリオ" panose="020B0604030504040204" pitchFamily="50" charset="-128"/>
+                  <a:ea typeface="メイリオ" panose="020B0604030504040204" pitchFamily="50" charset="-128"/>
+                </a:rPr>
+                <a:t>呼び出し</a:t>
+              </a:r>
+              <a:endParaRPr kumimoji="1" lang="en-US" altLang="ja-JP" sz="1200" dirty="0">
+                <a:latin typeface="メイリオ" panose="020B0604030504040204" pitchFamily="50" charset="-128"/>
+                <a:ea typeface="メイリオ" panose="020B0604030504040204" pitchFamily="50" charset="-128"/>
+              </a:endParaRPr>
+            </a:p>
+          </p:txBody>
+        </p:sp>
+        <p:sp>
+          <p:nvSpPr>
+            <p:cNvPr id="21" name="テキスト ボックス 20">
+              <a:extLst>
+                <a:ext uri="{FF2B5EF4-FFF2-40B4-BE49-F238E27FC236}">
+                  <a16:creationId xmlns:a16="http://schemas.microsoft.com/office/drawing/2014/main" id="{63BDB07E-0501-200C-1C40-96D503ED81CD}"/>
+                </a:ext>
+              </a:extLst>
+            </p:cNvPr>
+            <p:cNvSpPr txBox="1"/>
+            <p:nvPr/>
+          </p:nvSpPr>
+          <p:spPr>
+            <a:xfrm>
+              <a:off x="7493553" y="2467889"/>
+              <a:ext cx="800219" cy="276999"/>
+            </a:xfrm>
+            <a:prstGeom prst="rect">
+              <a:avLst/>
+            </a:prstGeom>
+            <a:noFill/>
+          </p:spPr>
+          <p:txBody>
+            <a:bodyPr wrap="none" rtlCol="0">
+              <a:spAutoFit/>
+            </a:bodyPr>
+            <a:lstStyle/>
+            <a:p>
+              <a:pPr algn="ctr"/>
+              <a:r>
+                <a:rPr kumimoji="1" lang="ja-JP" altLang="en-US" sz="1200" dirty="0">
+                  <a:latin typeface="メイリオ" panose="020B0604030504040204" pitchFamily="50" charset="-128"/>
+                  <a:ea typeface="メイリオ" panose="020B0604030504040204" pitchFamily="50" charset="-128"/>
+                </a:rPr>
+                <a:t>呼び出し</a:t>
+              </a:r>
+            </a:p>
+          </p:txBody>
+        </p:sp>
+        <p:sp>
+          <p:nvSpPr>
+            <p:cNvPr id="23" name="テキスト ボックス 22">
+              <a:extLst>
+                <a:ext uri="{FF2B5EF4-FFF2-40B4-BE49-F238E27FC236}">
+                  <a16:creationId xmlns:a16="http://schemas.microsoft.com/office/drawing/2014/main" id="{660E9CD3-2855-842B-B72A-F42F05A6D803}"/>
+                </a:ext>
+              </a:extLst>
+            </p:cNvPr>
+            <p:cNvSpPr txBox="1"/>
+            <p:nvPr/>
+          </p:nvSpPr>
+          <p:spPr>
+            <a:xfrm>
+              <a:off x="1824851" y="3105834"/>
+              <a:ext cx="1351652" cy="276999"/>
+            </a:xfrm>
+            <a:prstGeom prst="rect">
+              <a:avLst/>
+            </a:prstGeom>
+            <a:noFill/>
+          </p:spPr>
+          <p:txBody>
+            <a:bodyPr wrap="none" rtlCol="0">
+              <a:spAutoFit/>
+            </a:bodyPr>
+            <a:lstStyle/>
+            <a:p>
+              <a:pPr algn="ctr"/>
+              <a:r>
+                <a:rPr kumimoji="1" lang="en-US" altLang="ja-JP" sz="1200" dirty="0">
+                  <a:latin typeface="メイリオ" panose="020B0604030504040204" pitchFamily="50" charset="-128"/>
+                  <a:ea typeface="メイリオ" panose="020B0604030504040204" pitchFamily="50" charset="-128"/>
+                </a:rPr>
+                <a:t>Linux</a:t>
+              </a:r>
+              <a:r>
+                <a:rPr kumimoji="1" lang="ja-JP" altLang="en-US" sz="1200" dirty="0">
+                  <a:latin typeface="メイリオ" panose="020B0604030504040204" pitchFamily="50" charset="-128"/>
+                  <a:ea typeface="メイリオ" panose="020B0604030504040204" pitchFamily="50" charset="-128"/>
+                </a:rPr>
+                <a:t>標準の機能</a:t>
+              </a:r>
+            </a:p>
+          </p:txBody>
+        </p:sp>
+      </p:grpSp>
     </p:spTree>
     <p:extLst>
       <p:ext uri="{BB962C8B-B14F-4D97-AF65-F5344CB8AC3E}">

</xml_diff>